<commit_message>
Przykład pokazujący grupowanie, oraz klasy Restrictions, Projections, Subqueries
</commit_message>
<xml_diff>
--- a/Prezentacja/prezentacja.pptx
+++ b/Prezentacja/prezentacja.pptx
@@ -5,7 +5,7 @@
     <p:sldMasterId id="2147483702" r:id="rId1"/>
   </p:sldMasterIdLst>
   <p:notesMasterIdLst>
-    <p:notesMasterId r:id="rId9"/>
+    <p:notesMasterId r:id="rId10"/>
   </p:notesMasterIdLst>
   <p:sldIdLst>
     <p:sldId id="256" r:id="rId2"/>
@@ -15,6 +15,7 @@
     <p:sldId id="262" r:id="rId6"/>
     <p:sldId id="260" r:id="rId7"/>
     <p:sldId id="261" r:id="rId8"/>
+    <p:sldId id="263" r:id="rId9"/>
   </p:sldIdLst>
   <p:sldSz cx="12192000" cy="6858000"/>
   <p:notesSz cx="6858000" cy="9144000"/>
@@ -535,7 +536,7 @@
           <a:p>
             <a:fld id="{29A44125-6A3A-4A0C-AECE-9FBCEEC73172}" type="slidenum">
               <a:rPr lang="pl-PL"/>
-              <a:t>‹#›</a:t>
+              <a:t>1</a:t>
             </a:fld>
             <a:endParaRPr lang="pl-PL"/>
           </a:p>
@@ -619,7 +620,7 @@
           <a:p>
             <a:fld id="{29A44125-6A3A-4A0C-AECE-9FBCEEC73172}" type="slidenum">
               <a:rPr lang="pl-PL"/>
-              <a:t>‹#›</a:t>
+              <a:t>2</a:t>
             </a:fld>
             <a:endParaRPr lang="pl-PL"/>
           </a:p>
@@ -703,7 +704,7 @@
           <a:p>
             <a:fld id="{29A44125-6A3A-4A0C-AECE-9FBCEEC73172}" type="slidenum">
               <a:rPr lang="pl-PL"/>
-              <a:t>‹#›</a:t>
+              <a:t>3</a:t>
             </a:fld>
             <a:endParaRPr lang="pl-PL"/>
           </a:p>
@@ -787,7 +788,7 @@
           <a:p>
             <a:fld id="{29A44125-6A3A-4A0C-AECE-9FBCEEC73172}" type="slidenum">
               <a:rPr lang="pl-PL"/>
-              <a:t>‹#›</a:t>
+              <a:t>4</a:t>
             </a:fld>
             <a:endParaRPr lang="pl-PL"/>
           </a:p>
@@ -871,7 +872,7 @@
           <a:p>
             <a:fld id="{29A44125-6A3A-4A0C-AECE-9FBCEEC73172}" type="slidenum">
               <a:rPr lang="pl-PL"/>
-              <a:t>‹#›</a:t>
+              <a:t>5</a:t>
             </a:fld>
             <a:endParaRPr lang="pl-PL"/>
           </a:p>
@@ -955,7 +956,7 @@
           <a:p>
             <a:fld id="{29A44125-6A3A-4A0C-AECE-9FBCEEC73172}" type="slidenum">
               <a:rPr lang="pl-PL"/>
-              <a:t>‹#›</a:t>
+              <a:t>6</a:t>
             </a:fld>
             <a:endParaRPr lang="pl-PL"/>
           </a:p>
@@ -1039,7 +1040,7 @@
           <a:p>
             <a:fld id="{29A44125-6A3A-4A0C-AECE-9FBCEEC73172}" type="slidenum">
               <a:rPr lang="pl-PL"/>
-              <a:t>‹#›</a:t>
+              <a:t>7</a:t>
             </a:fld>
             <a:endParaRPr lang="pl-PL"/>
           </a:p>
@@ -1049,6 +1050,90 @@
     <p:extLst>
       <p:ext uri="{BB962C8B-B14F-4D97-AF65-F5344CB8AC3E}">
         <p14:creationId xmlns:p14="http://schemas.microsoft.com/office/powerpoint/2010/main" val="3926763482"/>
+      </p:ext>
+    </p:extLst>
+  </p:cSld>
+  <p:clrMapOvr>
+    <a:masterClrMapping/>
+  </p:clrMapOvr>
+</p:notes>
+</file>
+
+<file path=ppt/notesSlides/notesSlide8.xml><?xml version="1.0" encoding="utf-8"?>
+<p:notes xmlns:a="http://schemas.openxmlformats.org/drawingml/2006/main" xmlns:r="http://schemas.openxmlformats.org/officeDocument/2006/relationships" xmlns:p="http://schemas.openxmlformats.org/presentationml/2006/main">
+  <p:cSld>
+    <p:spTree>
+      <p:nvGrpSpPr>
+        <p:cNvPr id="1" name=""/>
+        <p:cNvGrpSpPr/>
+        <p:nvPr/>
+      </p:nvGrpSpPr>
+      <p:grpSpPr>
+        <a:xfrm>
+          <a:off x="0" y="0"/>
+          <a:ext cx="0" cy="0"/>
+          <a:chOff x="0" y="0"/>
+          <a:chExt cx="0" cy="0"/>
+        </a:xfrm>
+      </p:grpSpPr>
+      <p:sp>
+        <p:nvSpPr>
+          <p:cNvPr id="2" name="Symbol zastępczy obrazu slajdu 1"/>
+          <p:cNvSpPr>
+            <a:spLocks noGrp="1" noRot="1" noChangeAspect="1"/>
+          </p:cNvSpPr>
+          <p:nvPr>
+            <p:ph type="sldImg"/>
+          </p:nvPr>
+        </p:nvSpPr>
+        <p:spPr/>
+      </p:sp>
+      <p:sp>
+        <p:nvSpPr>
+          <p:cNvPr id="3" name="Symbol zastępczy notatek 2"/>
+          <p:cNvSpPr>
+            <a:spLocks noGrp="1"/>
+          </p:cNvSpPr>
+          <p:nvPr>
+            <p:ph type="body" idx="1"/>
+          </p:nvPr>
+        </p:nvSpPr>
+        <p:spPr/>
+        <p:txBody>
+          <a:bodyPr/>
+          <a:lstStyle/>
+          <a:p>
+            <a:endParaRPr lang="pl-PL"/>
+          </a:p>
+        </p:txBody>
+      </p:sp>
+      <p:sp>
+        <p:nvSpPr>
+          <p:cNvPr id="4" name="Symbol zastępczy numeru slajdu 3"/>
+          <p:cNvSpPr>
+            <a:spLocks noGrp="1"/>
+          </p:cNvSpPr>
+          <p:nvPr>
+            <p:ph type="sldNum" sz="quarter" idx="10"/>
+          </p:nvPr>
+        </p:nvSpPr>
+        <p:spPr/>
+        <p:txBody>
+          <a:bodyPr/>
+          <a:lstStyle/>
+          <a:p>
+            <a:fld id="{29A44125-6A3A-4A0C-AECE-9FBCEEC73172}" type="slidenum">
+              <a:rPr lang="pl-PL"/>
+              <a:t>‹#›</a:t>
+            </a:fld>
+            <a:endParaRPr lang="pl-PL"/>
+          </a:p>
+        </p:txBody>
+      </p:sp>
+    </p:spTree>
+    <p:extLst>
+      <p:ext uri="{BB962C8B-B14F-4D97-AF65-F5344CB8AC3E}">
+        <p14:creationId xmlns:p14="http://schemas.microsoft.com/office/powerpoint/2010/main" val="3126033931"/>
       </p:ext>
     </p:extLst>
   </p:cSld>
@@ -7345,7 +7430,7 @@
           <a:p>
             <a:r>
               <a:rPr lang="pl-PL" dirty="0"/>
-              <a:t>Zadanie</a:t>
+              <a:t>Zadanie 1</a:t>
             </a:r>
           </a:p>
         </p:txBody>
@@ -7431,6 +7516,87 @@
     <p:extLst>
       <p:ext uri="{BB962C8B-B14F-4D97-AF65-F5344CB8AC3E}">
         <p14:creationId xmlns:p14="http://schemas.microsoft.com/office/powerpoint/2010/main" val="281732523"/>
+      </p:ext>
+    </p:extLst>
+  </p:cSld>
+  <p:clrMapOvr>
+    <a:masterClrMapping/>
+  </p:clrMapOvr>
+</p:sld>
+</file>
+
+<file path=ppt/slides/slide8.xml><?xml version="1.0" encoding="utf-8"?>
+<p:sld xmlns:a="http://schemas.openxmlformats.org/drawingml/2006/main" xmlns:r="http://schemas.openxmlformats.org/officeDocument/2006/relationships" xmlns:p="http://schemas.openxmlformats.org/presentationml/2006/main">
+  <p:cSld>
+    <p:spTree>
+      <p:nvGrpSpPr>
+        <p:cNvPr id="1" name=""/>
+        <p:cNvGrpSpPr/>
+        <p:nvPr/>
+      </p:nvGrpSpPr>
+      <p:grpSpPr>
+        <a:xfrm>
+          <a:off x="0" y="0"/>
+          <a:ext cx="0" cy="0"/>
+          <a:chOff x="0" y="0"/>
+          <a:chExt cx="0" cy="0"/>
+        </a:xfrm>
+      </p:grpSpPr>
+      <p:sp>
+        <p:nvSpPr>
+          <p:cNvPr id="2" name="Tytuł 1"/>
+          <p:cNvSpPr>
+            <a:spLocks noGrp="1"/>
+          </p:cNvSpPr>
+          <p:nvPr>
+            <p:ph type="title"/>
+          </p:nvPr>
+        </p:nvSpPr>
+        <p:spPr/>
+        <p:txBody>
+          <a:bodyPr/>
+          <a:lstStyle/>
+          <a:p>
+            <a:r>
+              <a:rPr lang="pl-PL" dirty="0"/>
+              <a:t>Zadanie 2</a:t>
+            </a:r>
+          </a:p>
+        </p:txBody>
+      </p:sp>
+      <p:sp>
+        <p:nvSpPr>
+          <p:cNvPr id="3" name="Symbol zastępczy zawartości 2"/>
+          <p:cNvSpPr>
+            <a:spLocks noGrp="1"/>
+          </p:cNvSpPr>
+          <p:nvPr>
+            <p:ph idx="1"/>
+          </p:nvPr>
+        </p:nvSpPr>
+        <p:spPr/>
+        <p:txBody>
+          <a:bodyPr vert="horz" lIns="91440" tIns="45720" rIns="91440" bIns="45720" rtlCol="0" anchor="t">
+            <a:normAutofit/>
+          </a:bodyPr>
+          <a:lstStyle/>
+          <a:p>
+            <a:r>
+              <a:rPr lang="pl-PL" dirty="0"/>
+              <a:t>Znajdź zlecenie zawierające detale z określonymi produktami o określonej cenie minimalnej. Lista parametrów i ich ceny są parametrami zadania.</a:t>
+            </a:r>
+            <a:endParaRPr lang="pl-PL" dirty="0">
+              <a:solidFill>
+                <a:schemeClr val="tx1"/>
+              </a:solidFill>
+            </a:endParaRPr>
+          </a:p>
+        </p:txBody>
+      </p:sp>
+    </p:spTree>
+    <p:extLst>
+      <p:ext uri="{BB962C8B-B14F-4D97-AF65-F5344CB8AC3E}">
+        <p14:creationId xmlns:p14="http://schemas.microsoft.com/office/powerpoint/2010/main" val="2467835976"/>
       </p:ext>
     </p:extLst>
   </p:cSld>

</xml_diff>